<commit_message>
Update 0501 project05 - 파워포인트 - 서희.pptx
</commit_message>
<xml_diff>
--- a/0 발표용 파워포인트/0501 5차발표/0501 project05 - 파워포인트 - 서희.pptx
+++ b/0 발표용 파워포인트/0501 5차발표/0501 project05 - 파워포인트 - 서희.pptx
@@ -5,13 +5,14 @@
     <p:sldMasterId id="2147483648" r:id="rId1"/>
   </p:sldMasterIdLst>
   <p:notesMasterIdLst>
-    <p:notesMasterId r:id="rId6"/>
+    <p:notesMasterId r:id="rId7"/>
   </p:notesMasterIdLst>
   <p:sldIdLst>
     <p:sldId id="256" r:id="rId2"/>
     <p:sldId id="299" r:id="rId3"/>
     <p:sldId id="309" r:id="rId4"/>
     <p:sldId id="308" r:id="rId5"/>
+    <p:sldId id="310" r:id="rId6"/>
   </p:sldIdLst>
   <p:sldSz cx="12192000" cy="6858000"/>
   <p:notesSz cx="6858000" cy="9144000"/>
@@ -119,12 +120,13 @@
             <p14:sldId id="299"/>
             <p14:sldId id="309"/>
             <p14:sldId id="308"/>
+            <p14:sldId id="310"/>
           </p14:sldIdLst>
         </p14:section>
       </p14:sectionLst>
     </p:ext>
     <p:ext uri="{EFAFB233-063F-42B5-8137-9DF3F51BA10A}">
-      <p15:sldGuideLst xmlns:p15="http://schemas.microsoft.com/office/powerpoint/2012/main" xmlns="">
+      <p15:sldGuideLst xmlns="" xmlns:p15="http://schemas.microsoft.com/office/powerpoint/2012/main">
         <p15:guide id="1" orient="horz" pos="2160">
           <p15:clr>
             <a:srgbClr val="A4A3A4"/>
@@ -138,7 +140,7 @@
       </p15:sldGuideLst>
     </p:ext>
     <p:ext uri="{2D200454-40CA-4A62-9FC3-DE9A4176ACB9}">
-      <p15:notesGuideLst xmlns:p15="http://schemas.microsoft.com/office/powerpoint/2012/main" xmlns=""/>
+      <p15:notesGuideLst xmlns="" xmlns:p15="http://schemas.microsoft.com/office/powerpoint/2012/main"/>
     </p:ext>
   </p:extLst>
 </p:presentation>
@@ -3532,7 +3534,7 @@
                 <a:gridCol w="8032096">
                   <a:extLst>
                     <a:ext uri="{9D8B030D-6E8A-4147-A177-3AD203B41FA5}">
-                      <a16:colId xmlns="" xmlns:a16="http://schemas.microsoft.com/office/drawing/2014/main" val="20000"/>
+                      <a16:colId xmlns:a16="http://schemas.microsoft.com/office/drawing/2014/main" xmlns="" val="20000"/>
                     </a:ext>
                   </a:extLst>
                 </a:gridCol>
@@ -3597,7 +3599,7 @@
                 </a:tc>
                 <a:extLst>
                   <a:ext uri="{0D108BD9-81ED-4DB2-BD59-A6C34878D82A}">
-                    <a16:rowId xmlns="" xmlns:a16="http://schemas.microsoft.com/office/drawing/2014/main" val="10000"/>
+                    <a16:rowId xmlns:a16="http://schemas.microsoft.com/office/drawing/2014/main" xmlns="" val="10000"/>
                   </a:ext>
                 </a:extLst>
               </a:tr>
@@ -3661,7 +3663,7 @@
                 </a:tc>
                 <a:extLst>
                   <a:ext uri="{0D108BD9-81ED-4DB2-BD59-A6C34878D82A}">
-                    <a16:rowId xmlns="" xmlns:a16="http://schemas.microsoft.com/office/drawing/2014/main" val="10001"/>
+                    <a16:rowId xmlns:a16="http://schemas.microsoft.com/office/drawing/2014/main" xmlns="" val="10001"/>
                   </a:ext>
                 </a:extLst>
               </a:tr>
@@ -4208,14 +4210,14 @@
                 <a:gridCol w="342705">
                   <a:extLst>
                     <a:ext uri="{9D8B030D-6E8A-4147-A177-3AD203B41FA5}">
-                      <a16:colId xmlns="" xmlns:a16="http://schemas.microsoft.com/office/drawing/2014/main" val="20000"/>
+                      <a16:colId xmlns:a16="http://schemas.microsoft.com/office/drawing/2014/main" xmlns="" val="20000"/>
                     </a:ext>
                   </a:extLst>
                 </a:gridCol>
                 <a:gridCol w="3149108">
                   <a:extLst>
                     <a:ext uri="{9D8B030D-6E8A-4147-A177-3AD203B41FA5}">
-                      <a16:colId xmlns="" xmlns:a16="http://schemas.microsoft.com/office/drawing/2014/main" val="20001"/>
+                      <a16:colId xmlns:a16="http://schemas.microsoft.com/office/drawing/2014/main" xmlns="" val="20001"/>
                     </a:ext>
                   </a:extLst>
                 </a:gridCol>
@@ -4312,7 +4314,7 @@
                 </a:tc>
                 <a:extLst>
                   <a:ext uri="{0D108BD9-81ED-4DB2-BD59-A6C34878D82A}">
-                    <a16:rowId xmlns="" xmlns:a16="http://schemas.microsoft.com/office/drawing/2014/main" val="10000"/>
+                    <a16:rowId xmlns:a16="http://schemas.microsoft.com/office/drawing/2014/main" xmlns="" val="10000"/>
                   </a:ext>
                 </a:extLst>
               </a:tr>
@@ -4442,7 +4444,7 @@
                 </a:tc>
                 <a:extLst>
                   <a:ext uri="{0D108BD9-81ED-4DB2-BD59-A6C34878D82A}">
-                    <a16:rowId xmlns="" xmlns:a16="http://schemas.microsoft.com/office/drawing/2014/main" val="10001"/>
+                    <a16:rowId xmlns:a16="http://schemas.microsoft.com/office/drawing/2014/main" xmlns="" val="10001"/>
                   </a:ext>
                 </a:extLst>
               </a:tr>
@@ -4560,7 +4562,7 @@
                 <a:gridCol w="8032096">
                   <a:extLst>
                     <a:ext uri="{9D8B030D-6E8A-4147-A177-3AD203B41FA5}">
-                      <a16:colId xmlns="" xmlns:a16="http://schemas.microsoft.com/office/drawing/2014/main" val="20000"/>
+                      <a16:colId xmlns:a16="http://schemas.microsoft.com/office/drawing/2014/main" xmlns="" val="20000"/>
                     </a:ext>
                   </a:extLst>
                 </a:gridCol>
@@ -4629,7 +4631,7 @@
                 </a:tc>
                 <a:extLst>
                   <a:ext uri="{0D108BD9-81ED-4DB2-BD59-A6C34878D82A}">
-                    <a16:rowId xmlns="" xmlns:a16="http://schemas.microsoft.com/office/drawing/2014/main" val="10000"/>
+                    <a16:rowId xmlns:a16="http://schemas.microsoft.com/office/drawing/2014/main" xmlns="" val="10000"/>
                   </a:ext>
                 </a:extLst>
               </a:tr>
@@ -5779,6 +5781,373 @@
       </p:par>
     </p:tnLst>
   </p:timing>
+</p:sld>
+</file>
+
+<file path=ppt/slides/slide5.xml><?xml version="1.0" encoding="utf-8"?>
+<p:sld xmlns:a="http://schemas.openxmlformats.org/drawingml/2006/main" xmlns:r="http://schemas.openxmlformats.org/officeDocument/2006/relationships" xmlns:p="http://schemas.openxmlformats.org/presentationml/2006/main">
+  <p:cSld>
+    <p:spTree>
+      <p:nvGrpSpPr>
+        <p:cNvPr id="1" name=""/>
+        <p:cNvGrpSpPr/>
+        <p:nvPr/>
+      </p:nvGrpSpPr>
+      <p:grpSpPr>
+        <a:xfrm>
+          <a:off x="0" y="0"/>
+          <a:ext cx="0" cy="0"/>
+          <a:chOff x="0" y="0"/>
+          <a:chExt cx="0" cy="0"/>
+        </a:xfrm>
+      </p:grpSpPr>
+      <p:pic>
+        <p:nvPicPr>
+          <p:cNvPr id="1026" name="Picture 2"/>
+          <p:cNvPicPr>
+            <a:picLocks noChangeAspect="1" noChangeArrowheads="1"/>
+          </p:cNvPicPr>
+          <p:nvPr/>
+        </p:nvPicPr>
+        <p:blipFill>
+          <a:blip r:embed="rId2">
+            <a:extLst>
+              <a:ext uri="{28A0092B-C50C-407E-A947-70E740481C1C}">
+                <a14:useLocalDpi xmlns:a14="http://schemas.microsoft.com/office/drawing/2010/main" val="0"/>
+              </a:ext>
+            </a:extLst>
+          </a:blip>
+          <a:srcRect/>
+          <a:stretch>
+            <a:fillRect/>
+          </a:stretch>
+        </p:blipFill>
+        <p:spPr bwMode="auto">
+          <a:xfrm>
+            <a:off x="1367661" y="1342767"/>
+            <a:ext cx="2827200" cy="5292811"/>
+          </a:xfrm>
+          <a:prstGeom prst="rect">
+            <a:avLst/>
+          </a:prstGeom>
+          <a:noFill/>
+          <a:ln>
+            <a:noFill/>
+          </a:ln>
+          <a:effectLst/>
+          <a:extLst>
+            <a:ext uri="{909E8E84-426E-40DD-AFC4-6F175D3DCCD1}">
+              <a14:hiddenFill xmlns:a14="http://schemas.microsoft.com/office/drawing/2010/main">
+                <a:solidFill>
+                  <a:schemeClr val="accent1"/>
+                </a:solidFill>
+              </a14:hiddenFill>
+            </a:ext>
+            <a:ext uri="{91240B29-F687-4F45-9708-019B960494DF}">
+              <a14:hiddenLine xmlns:a14="http://schemas.microsoft.com/office/drawing/2010/main" w="9525">
+                <a:solidFill>
+                  <a:schemeClr val="tx1"/>
+                </a:solidFill>
+                <a:miter lim="800000"/>
+                <a:headEnd/>
+                <a:tailEnd/>
+              </a14:hiddenLine>
+            </a:ext>
+            <a:ext uri="{AF507438-7753-43E0-B8FC-AC1667EBCBE1}">
+              <a14:hiddenEffects xmlns:a14="http://schemas.microsoft.com/office/drawing/2010/main">
+                <a:effectLst>
+                  <a:outerShdw dist="35921" dir="2700000" algn="ctr" rotWithShape="0">
+                    <a:schemeClr val="bg2"/>
+                  </a:outerShdw>
+                </a:effectLst>
+              </a14:hiddenEffects>
+            </a:ext>
+          </a:extLst>
+        </p:spPr>
+      </p:pic>
+      <p:sp>
+        <p:nvSpPr>
+          <p:cNvPr id="5" name="직사각형 4"/>
+          <p:cNvSpPr/>
+          <p:nvPr/>
+        </p:nvSpPr>
+        <p:spPr>
+          <a:xfrm>
+            <a:off x="229905" y="222351"/>
+            <a:ext cx="9421169" cy="477054"/>
+          </a:xfrm>
+          <a:prstGeom prst="rect">
+            <a:avLst/>
+          </a:prstGeom>
+        </p:spPr>
+        <p:txBody>
+          <a:bodyPr wrap="none">
+            <a:spAutoFit/>
+          </a:bodyPr>
+          <a:lstStyle/>
+          <a:p>
+            <a:pPr lvl="0" algn="ctr">
+              <a:buClr>
+                <a:srgbClr val="000000"/>
+              </a:buClr>
+              <a:buSzPts val="1500"/>
+              <a:defRPr/>
+            </a:pPr>
+            <a:r>
+              <a:rPr lang="en-US" altLang="ko-KR" sz="2500" dirty="0" smtClean="0">
+                <a:solidFill>
+                  <a:schemeClr val="bg1"/>
+                </a:solidFill>
+                <a:latin typeface="+mj-lt"/>
+              </a:rPr>
+              <a:t>[</a:t>
+            </a:r>
+            <a:r>
+              <a:rPr lang="ko-KR" altLang="en-US" sz="2500" dirty="0" smtClean="0">
+                <a:solidFill>
+                  <a:schemeClr val="bg1"/>
+                </a:solidFill>
+                <a:latin typeface="+mj-lt"/>
+              </a:rPr>
+              <a:t>화면 구현</a:t>
+            </a:r>
+            <a:r>
+              <a:rPr lang="en-US" altLang="ko-KR" sz="2500" dirty="0" smtClean="0">
+                <a:solidFill>
+                  <a:schemeClr val="bg1"/>
+                </a:solidFill>
+                <a:latin typeface="+mj-lt"/>
+              </a:rPr>
+              <a:t>]</a:t>
+            </a:r>
+            <a:r>
+              <a:rPr lang="ko-KR" altLang="en-US" sz="2500" dirty="0" smtClean="0">
+                <a:solidFill>
+                  <a:schemeClr val="bg1"/>
+                </a:solidFill>
+                <a:latin typeface="+mj-lt"/>
+              </a:rPr>
+              <a:t>사용자</a:t>
+            </a:r>
+            <a:r>
+              <a:rPr lang="en-US" altLang="ko-KR" sz="2500" dirty="0">
+                <a:solidFill>
+                  <a:schemeClr val="bg1"/>
+                </a:solidFill>
+              </a:rPr>
+              <a:t> - </a:t>
+            </a:r>
+            <a:r>
+              <a:rPr lang="ko-KR" altLang="en-US" sz="2500" dirty="0">
+                <a:solidFill>
+                  <a:schemeClr val="bg1"/>
+                </a:solidFill>
+              </a:rPr>
+              <a:t>웹</a:t>
+            </a:r>
+            <a:r>
+              <a:rPr lang="ko-KR" altLang="en-US" sz="2500" dirty="0" smtClean="0">
+                <a:solidFill>
+                  <a:schemeClr val="bg1"/>
+                </a:solidFill>
+                <a:latin typeface="+mj-lt"/>
+              </a:rPr>
+              <a:t> </a:t>
+            </a:r>
+            <a:r>
+              <a:rPr lang="en-US" altLang="ko-KR" sz="2500" dirty="0" smtClean="0">
+                <a:solidFill>
+                  <a:schemeClr val="bg1"/>
+                </a:solidFill>
+                <a:latin typeface="+mj-lt"/>
+              </a:rPr>
+              <a:t>– </a:t>
+            </a:r>
+            <a:r>
+              <a:rPr lang="ko-KR" altLang="en-US" sz="2500" dirty="0" smtClean="0">
+                <a:solidFill>
+                  <a:schemeClr val="bg1"/>
+                </a:solidFill>
+                <a:latin typeface="+mj-lt"/>
+              </a:rPr>
+              <a:t>세미나 상세페이지 </a:t>
+            </a:r>
+            <a:r>
+              <a:rPr lang="en-US" altLang="ko-KR" sz="2500" dirty="0" smtClean="0">
+                <a:solidFill>
+                  <a:schemeClr val="bg1"/>
+                </a:solidFill>
+                <a:latin typeface="+mj-lt"/>
+              </a:rPr>
+              <a:t>– </a:t>
+            </a:r>
+            <a:r>
+              <a:rPr lang="ko-KR" altLang="en-US" sz="2500" dirty="0" smtClean="0">
+                <a:solidFill>
+                  <a:schemeClr val="bg1"/>
+                </a:solidFill>
+                <a:latin typeface="+mj-lt"/>
+              </a:rPr>
+              <a:t>세미나 문의</a:t>
+            </a:r>
+            <a:r>
+              <a:rPr lang="en-US" altLang="ko-KR" sz="2500" dirty="0" smtClean="0">
+                <a:solidFill>
+                  <a:schemeClr val="bg1"/>
+                </a:solidFill>
+                <a:latin typeface="+mj-lt"/>
+              </a:rPr>
+              <a:t>(</a:t>
+            </a:r>
+            <a:r>
+              <a:rPr lang="ko-KR" altLang="en-US" sz="2500" dirty="0" err="1" smtClean="0">
+                <a:solidFill>
+                  <a:schemeClr val="bg1"/>
+                </a:solidFill>
+                <a:latin typeface="+mj-lt"/>
+              </a:rPr>
+              <a:t>모달</a:t>
+            </a:r>
+            <a:r>
+              <a:rPr lang="en-US" altLang="ko-KR" sz="2500" dirty="0" smtClean="0">
+                <a:solidFill>
+                  <a:schemeClr val="bg1"/>
+                </a:solidFill>
+                <a:latin typeface="+mj-lt"/>
+              </a:rPr>
+              <a:t>)</a:t>
+            </a:r>
+            <a:endParaRPr lang="ko-KR" altLang="en-US" sz="2500" dirty="0">
+              <a:solidFill>
+                <a:schemeClr val="bg1"/>
+              </a:solidFill>
+              <a:latin typeface="+mj-lt"/>
+            </a:endParaRPr>
+          </a:p>
+        </p:txBody>
+      </p:sp>
+      <p:sp>
+        <p:nvSpPr>
+          <p:cNvPr id="4" name="직사각형 3"/>
+          <p:cNvSpPr/>
+          <p:nvPr/>
+        </p:nvSpPr>
+        <p:spPr>
+          <a:xfrm>
+            <a:off x="1070919" y="4110681"/>
+            <a:ext cx="3311611" cy="576649"/>
+          </a:xfrm>
+          <a:prstGeom prst="rect">
+            <a:avLst/>
+          </a:prstGeom>
+          <a:noFill/>
+          <a:ln>
+            <a:solidFill>
+              <a:srgbClr val="FF0000"/>
+            </a:solidFill>
+          </a:ln>
+        </p:spPr>
+        <p:style>
+          <a:lnRef idx="2">
+            <a:schemeClr val="accent1">
+              <a:shade val="50000"/>
+            </a:schemeClr>
+          </a:lnRef>
+          <a:fillRef idx="1">
+            <a:schemeClr val="accent1"/>
+          </a:fillRef>
+          <a:effectRef idx="0">
+            <a:schemeClr val="accent1"/>
+          </a:effectRef>
+          <a:fontRef idx="minor">
+            <a:schemeClr val="lt1"/>
+          </a:fontRef>
+        </p:style>
+        <p:txBody>
+          <a:bodyPr rtlCol="0" anchor="ctr"/>
+          <a:lstStyle/>
+          <a:p>
+            <a:pPr algn="ctr"/>
+            <a:endParaRPr lang="ko-KR" altLang="en-US">
+              <a:ln>
+                <a:solidFill>
+                  <a:srgbClr val="FF0000"/>
+                </a:solidFill>
+              </a:ln>
+              <a:noFill/>
+            </a:endParaRPr>
+          </a:p>
+        </p:txBody>
+      </p:sp>
+      <p:pic>
+        <p:nvPicPr>
+          <p:cNvPr id="1027" name="Picture 3"/>
+          <p:cNvPicPr>
+            <a:picLocks noChangeAspect="1" noChangeArrowheads="1"/>
+          </p:cNvPicPr>
+          <p:nvPr/>
+        </p:nvPicPr>
+        <p:blipFill>
+          <a:blip r:embed="rId3">
+            <a:extLst>
+              <a:ext uri="{28A0092B-C50C-407E-A947-70E740481C1C}">
+                <a14:useLocalDpi xmlns:a14="http://schemas.microsoft.com/office/drawing/2010/main" val="0"/>
+              </a:ext>
+            </a:extLst>
+          </a:blip>
+          <a:srcRect/>
+          <a:stretch>
+            <a:fillRect/>
+          </a:stretch>
+        </p:blipFill>
+        <p:spPr bwMode="auto">
+          <a:xfrm>
+            <a:off x="4693354" y="3142134"/>
+            <a:ext cx="7237455" cy="921866"/>
+          </a:xfrm>
+          <a:prstGeom prst="rect">
+            <a:avLst/>
+          </a:prstGeom>
+          <a:noFill/>
+          <a:ln w="9525">
+            <a:solidFill>
+              <a:schemeClr val="tx1"/>
+            </a:solidFill>
+            <a:miter lim="800000"/>
+            <a:headEnd/>
+            <a:tailEnd/>
+          </a:ln>
+          <a:effectLst/>
+          <a:extLst>
+            <a:ext uri="{909E8E84-426E-40DD-AFC4-6F175D3DCCD1}">
+              <a14:hiddenFill xmlns:a14="http://schemas.microsoft.com/office/drawing/2010/main">
+                <a:solidFill>
+                  <a:schemeClr val="accent1"/>
+                </a:solidFill>
+              </a14:hiddenFill>
+            </a:ext>
+            <a:ext uri="{AF507438-7753-43E0-B8FC-AC1667EBCBE1}">
+              <a14:hiddenEffects xmlns:a14="http://schemas.microsoft.com/office/drawing/2010/main">
+                <a:effectLst>
+                  <a:outerShdw dist="35921" dir="2700000" algn="ctr" rotWithShape="0">
+                    <a:schemeClr val="bg2"/>
+                  </a:outerShdw>
+                </a:effectLst>
+              </a14:hiddenEffects>
+            </a:ext>
+          </a:extLst>
+        </p:spPr>
+      </p:pic>
+    </p:spTree>
+    <p:extLst>
+      <p:ext uri="{BB962C8B-B14F-4D97-AF65-F5344CB8AC3E}">
+        <p14:creationId xmlns:p14="http://schemas.microsoft.com/office/powerpoint/2010/main" val="62175597"/>
+      </p:ext>
+    </p:extLst>
+  </p:cSld>
+  <p:clrMapOvr>
+    <a:masterClrMapping/>
+  </p:clrMapOvr>
 </p:sld>
 </file>
 
@@ -6037,7 +6406,7 @@
   <a:extraClrSchemeLst/>
   <a:extLst>
     <a:ext uri="{05A4C25C-085E-4340-85A3-A5531E510DB2}">
-      <thm15:themeFamily xmlns:thm15="http://schemas.microsoft.com/office/thememl/2012/main" xmlns="" name="Office Theme" id="{62F939B6-93AF-4DB8-9C6B-D6C7DFDC589F}" vid="{4A3C46E8-61CC-4603-A589-7422A47A8E4A}"/>
+      <thm15:themeFamily xmlns="" xmlns:thm15="http://schemas.microsoft.com/office/thememl/2012/main" name="Office Theme" id="{62F939B6-93AF-4DB8-9C6B-D6C7DFDC589F}" vid="{4A3C46E8-61CC-4603-A589-7422A47A8E4A}"/>
     </a:ext>
   </a:extLst>
 </a:theme>
@@ -6298,7 +6667,7 @@
   <a:extraClrSchemeLst/>
   <a:extLst>
     <a:ext uri="{05A4C25C-085E-4340-85A3-A5531E510DB2}">
-      <thm15:themeFamily xmlns:thm15="http://schemas.microsoft.com/office/thememl/2012/main" xmlns="" name="Office Theme" id="{62F939B6-93AF-4DB8-9C6B-D6C7DFDC589F}" vid="{4A3C46E8-61CC-4603-A589-7422A47A8E4A}"/>
+      <thm15:themeFamily xmlns="" xmlns:thm15="http://schemas.microsoft.com/office/thememl/2012/main" name="Office Theme" id="{62F939B6-93AF-4DB8-9C6B-D6C7DFDC589F}" vid="{4A3C46E8-61CC-4603-A589-7422A47A8E4A}"/>
     </a:ext>
   </a:extLst>
 </a:theme>

</xml_diff>